<commit_message>
Modifs Backlog et Charte
</commit_message>
<xml_diff>
--- a/CharteProjet.pptx
+++ b/CharteProjet.pptx
@@ -112,6 +112,36 @@
       </a:defRPr>
     </a:lvl9pPr>
   </p:defaultTextStyle>
+  <p:extLst>
+    <p:ext uri="{EFAFB233-063F-42B5-8137-9DF3F51BA10A}">
+      <p15:sldGuideLst xmlns:p15="http://schemas.microsoft.com/office/powerpoint/2012/main">
+        <p15:guide id="1" orient="horz" pos="2160">
+          <p15:clr>
+            <a:srgbClr val="A4A3A4"/>
+          </p15:clr>
+        </p15:guide>
+        <p15:guide id="2" pos="2880">
+          <p15:clr>
+            <a:srgbClr val="A4A3A4"/>
+          </p15:clr>
+        </p15:guide>
+      </p15:sldGuideLst>
+    </p:ext>
+    <p:ext uri="{2D200454-40CA-4A62-9FC3-DE9A4176ACB9}">
+      <p15:notesGuideLst xmlns:p15="http://schemas.microsoft.com/office/powerpoint/2012/main">
+        <p15:guide id="1" orient="horz" pos="3127">
+          <p15:clr>
+            <a:srgbClr val="A4A3A4"/>
+          </p15:clr>
+        </p15:guide>
+        <p15:guide id="2" pos="2099">
+          <p15:clr>
+            <a:srgbClr val="A4A3A4"/>
+          </p15:clr>
+        </p15:guide>
+      </p15:notesGuideLst>
+    </p:ext>
+  </p:extLst>
 </p:presentation>
 </file>
 
@@ -265,7 +295,7 @@
             <a:fld id="{BBDD1A8C-8F20-4362-8772-22B0B3896B78}" type="slidenum">
               <a:rPr lang="fr-FR" smtClean="0"/>
               <a:pPr/>
-              <a:t>‹#›</a:t>
+              <a:t>‹N°›</a:t>
             </a:fld>
             <a:endParaRPr lang="fr-FR"/>
           </a:p>
@@ -274,7 +304,7 @@
     </p:spTree>
     <p:extLst>
       <p:ext uri="{BB962C8B-B14F-4D97-AF65-F5344CB8AC3E}">
-        <p14:creationId xmlns:p14="http://schemas.microsoft.com/office/powerpoint/2010/main" xmlns="" val="2485085303"/>
+        <p14:creationId xmlns:p14="http://schemas.microsoft.com/office/powerpoint/2010/main" val="2485085303"/>
       </p:ext>
     </p:extLst>
   </p:cSld>
@@ -507,7 +537,7 @@
             <a:fld id="{DC39424C-219B-47DA-9C75-6894B41135E6}" type="slidenum">
               <a:rPr lang="fr-FR" smtClean="0"/>
               <a:pPr/>
-              <a:t>‹#›</a:t>
+              <a:t>‹N°›</a:t>
             </a:fld>
             <a:endParaRPr lang="fr-FR"/>
           </a:p>
@@ -674,7 +704,7 @@
             <a:fld id="{DC39424C-219B-47DA-9C75-6894B41135E6}" type="slidenum">
               <a:rPr lang="fr-FR" smtClean="0"/>
               <a:pPr/>
-              <a:t>‹#›</a:t>
+              <a:t>‹N°›</a:t>
             </a:fld>
             <a:endParaRPr lang="fr-FR"/>
           </a:p>
@@ -858,7 +888,7 @@
             <a:fld id="{DC39424C-219B-47DA-9C75-6894B41135E6}" type="slidenum">
               <a:rPr lang="fr-FR" smtClean="0"/>
               <a:pPr/>
-              <a:t>‹#›</a:t>
+              <a:t>‹N°›</a:t>
             </a:fld>
             <a:endParaRPr lang="fr-FR"/>
           </a:p>
@@ -1127,7 +1157,7 @@
             <a:fld id="{3B5823D0-37EA-4EAC-AE7D-6AEFFE7A699D}" type="slidenum">
               <a:rPr lang="fr-FR" smtClean="0"/>
               <a:pPr/>
-              <a:t>‹#›</a:t>
+              <a:t>‹N°›</a:t>
             </a:fld>
             <a:endParaRPr lang="fr-FR"/>
           </a:p>
@@ -1618,7 +1648,7 @@
             <a:fld id="{DC39424C-219B-47DA-9C75-6894B41135E6}" type="slidenum">
               <a:rPr lang="fr-FR" smtClean="0"/>
               <a:pPr/>
-              <a:t>‹#›</a:t>
+              <a:t>‹N°›</a:t>
             </a:fld>
             <a:endParaRPr lang="fr-FR"/>
           </a:p>
@@ -1848,7 +1878,7 @@
             <a:fld id="{DC39424C-219B-47DA-9C75-6894B41135E6}" type="slidenum">
               <a:rPr lang="fr-FR" smtClean="0"/>
               <a:pPr/>
-              <a:t>‹#›</a:t>
+              <a:t>‹N°›</a:t>
             </a:fld>
             <a:endParaRPr lang="fr-FR"/>
           </a:p>
@@ -2208,7 +2238,7 @@
             <a:fld id="{DC39424C-219B-47DA-9C75-6894B41135E6}" type="slidenum">
               <a:rPr lang="fr-FR" smtClean="0"/>
               <a:pPr/>
-              <a:t>‹#›</a:t>
+              <a:t>‹N°›</a:t>
             </a:fld>
             <a:endParaRPr lang="fr-FR"/>
           </a:p>
@@ -2497,7 +2527,7 @@
             <a:fld id="{DC39424C-219B-47DA-9C75-6894B41135E6}" type="slidenum">
               <a:rPr lang="fr-FR" smtClean="0"/>
               <a:pPr/>
-              <a:t>‹#›</a:t>
+              <a:t>‹N°›</a:t>
             </a:fld>
             <a:endParaRPr lang="fr-FR"/>
           </a:p>
@@ -2921,7 +2951,7 @@
             <a:fld id="{DC39424C-219B-47DA-9C75-6894B41135E6}" type="slidenum">
               <a:rPr lang="fr-FR" smtClean="0"/>
               <a:pPr/>
-              <a:t>‹#›</a:t>
+              <a:t>‹N°›</a:t>
             </a:fld>
             <a:endParaRPr lang="fr-FR"/>
           </a:p>
@@ -3038,7 +3068,7 @@
             <a:fld id="{DC39424C-219B-47DA-9C75-6894B41135E6}" type="slidenum">
               <a:rPr lang="fr-FR" smtClean="0"/>
               <a:pPr/>
-              <a:t>‹#›</a:t>
+              <a:t>‹N°›</a:t>
             </a:fld>
             <a:endParaRPr lang="fr-FR"/>
           </a:p>
@@ -3130,7 +3160,7 @@
             <a:fld id="{DC39424C-219B-47DA-9C75-6894B41135E6}" type="slidenum">
               <a:rPr lang="fr-FR" smtClean="0"/>
               <a:pPr/>
-              <a:t>‹#›</a:t>
+              <a:t>‹N°›</a:t>
             </a:fld>
             <a:endParaRPr lang="fr-FR"/>
           </a:p>
@@ -3297,7 +3327,7 @@
             <a:fld id="{DC39424C-219B-47DA-9C75-6894B41135E6}" type="slidenum">
               <a:rPr lang="fr-FR" smtClean="0"/>
               <a:pPr/>
-              <a:t>‹#›</a:t>
+              <a:t>‹N°›</a:t>
             </a:fld>
             <a:endParaRPr lang="fr-FR"/>
           </a:p>
@@ -3577,7 +3607,7 @@
             <a:fld id="{DC39424C-219B-47DA-9C75-6894B41135E6}" type="slidenum">
               <a:rPr lang="fr-FR" smtClean="0"/>
               <a:pPr/>
-              <a:t>‹#›</a:t>
+              <a:t>‹N°›</a:t>
             </a:fld>
             <a:endParaRPr lang="fr-FR"/>
           </a:p>
@@ -4059,7 +4089,7 @@
             <a:fld id="{DC39424C-219B-47DA-9C75-6894B41135E6}" type="slidenum">
               <a:rPr lang="fr-FR" smtClean="0"/>
               <a:pPr/>
-              <a:t>‹#›</a:t>
+              <a:t>‹N°›</a:t>
             </a:fld>
             <a:endParaRPr lang="fr-FR"/>
           </a:p>
@@ -4230,7 +4260,7 @@
             <a:fld id="{DC39424C-219B-47DA-9C75-6894B41135E6}" type="slidenum">
               <a:rPr lang="fr-FR" smtClean="0"/>
               <a:pPr/>
-              <a:t>‹#›</a:t>
+              <a:t>‹N°›</a:t>
             </a:fld>
             <a:endParaRPr lang="fr-FR"/>
           </a:p>
@@ -4517,7 +4547,7 @@
             <a:fld id="{DC39424C-219B-47DA-9C75-6894B41135E6}" type="slidenum">
               <a:rPr lang="fr-FR" smtClean="0"/>
               <a:pPr/>
-              <a:t>‹#›</a:t>
+              <a:t>‹N°›</a:t>
             </a:fld>
             <a:endParaRPr lang="fr-FR"/>
           </a:p>
@@ -4760,7 +4790,7 @@
             <a:fld id="{DC39424C-219B-47DA-9C75-6894B41135E6}" type="slidenum">
               <a:rPr lang="fr-FR" smtClean="0"/>
               <a:pPr/>
-              <a:t>‹#›</a:t>
+              <a:t>‹N°›</a:t>
             </a:fld>
             <a:endParaRPr lang="fr-FR"/>
           </a:p>
@@ -5045,7 +5075,7 @@
             <a:fld id="{DC39424C-219B-47DA-9C75-6894B41135E6}" type="slidenum">
               <a:rPr lang="fr-FR" smtClean="0"/>
               <a:pPr/>
-              <a:t>‹#›</a:t>
+              <a:t>‹N°›</a:t>
             </a:fld>
             <a:endParaRPr lang="fr-FR"/>
           </a:p>
@@ -5464,7 +5494,7 @@
             <a:fld id="{DC39424C-219B-47DA-9C75-6894B41135E6}" type="slidenum">
               <a:rPr lang="fr-FR" smtClean="0"/>
               <a:pPr/>
-              <a:t>‹#›</a:t>
+              <a:t>‹N°›</a:t>
             </a:fld>
             <a:endParaRPr lang="fr-FR"/>
           </a:p>
@@ -5579,7 +5609,7 @@
             <a:fld id="{DC39424C-219B-47DA-9C75-6894B41135E6}" type="slidenum">
               <a:rPr lang="fr-FR" smtClean="0"/>
               <a:pPr/>
-              <a:t>‹#›</a:t>
+              <a:t>‹N°›</a:t>
             </a:fld>
             <a:endParaRPr lang="fr-FR"/>
           </a:p>
@@ -5671,7 +5701,7 @@
             <a:fld id="{DC39424C-219B-47DA-9C75-6894B41135E6}" type="slidenum">
               <a:rPr lang="fr-FR" smtClean="0"/>
               <a:pPr/>
-              <a:t>‹#›</a:t>
+              <a:t>‹N°›</a:t>
             </a:fld>
             <a:endParaRPr lang="fr-FR"/>
           </a:p>
@@ -5945,7 +5975,7 @@
             <a:fld id="{DC39424C-219B-47DA-9C75-6894B41135E6}" type="slidenum">
               <a:rPr lang="fr-FR" smtClean="0"/>
               <a:pPr/>
-              <a:t>‹#›</a:t>
+              <a:t>‹N°›</a:t>
             </a:fld>
             <a:endParaRPr lang="fr-FR"/>
           </a:p>
@@ -6195,7 +6225,7 @@
             <a:fld id="{DC39424C-219B-47DA-9C75-6894B41135E6}" type="slidenum">
               <a:rPr lang="fr-FR" smtClean="0"/>
               <a:pPr/>
-              <a:t>‹#›</a:t>
+              <a:t>‹N°›</a:t>
             </a:fld>
             <a:endParaRPr lang="fr-FR"/>
           </a:p>
@@ -6441,7 +6471,7 @@
             <a:fld id="{DC39424C-219B-47DA-9C75-6894B41135E6}" type="slidenum">
               <a:rPr lang="fr-FR" smtClean="0"/>
               <a:pPr/>
-              <a:t>‹#›</a:t>
+              <a:t>‹N°›</a:t>
             </a:fld>
             <a:endParaRPr lang="fr-FR"/>
           </a:p>
@@ -7073,7 +7103,7 @@
             <a:fld id="{DC39424C-219B-47DA-9C75-6894B41135E6}" type="slidenum">
               <a:rPr lang="fr-FR" smtClean="0"/>
               <a:pPr/>
-              <a:t>‹#›</a:t>
+              <a:t>‹N°›</a:t>
             </a:fld>
             <a:endParaRPr lang="fr-FR"/>
           </a:p>
@@ -7418,10 +7448,6 @@
               <a:rPr lang="fr-FR" dirty="0" smtClean="0"/>
               <a:t>Jeux de plateau</a:t>
             </a:r>
-            <a:r>
-              <a:rPr lang="fr-FR" dirty="0" smtClean="0"/>
-              <a:t/>
-            </a:r>
             <a:br>
               <a:rPr lang="fr-FR" dirty="0" smtClean="0"/>
             </a:br>
@@ -7455,19 +7481,7 @@
           <a:p>
             <a:r>
               <a:rPr lang="fr-FR" dirty="0" smtClean="0"/>
-              <a:t>Jeux </a:t>
-            </a:r>
-            <a:r>
-              <a:rPr lang="fr-FR" dirty="0" smtClean="0"/>
-              <a:t>de plateau </a:t>
-            </a:r>
-            <a:r>
-              <a:rPr lang="fr-FR" dirty="0" smtClean="0"/>
-              <a:t>en </a:t>
-            </a:r>
-            <a:r>
-              <a:rPr lang="fr-FR" dirty="0" smtClean="0"/>
-              <a:t>réalité augmenté.</a:t>
+              <a:t>Jeux de plateau en réalité augmenté.</a:t>
             </a:r>
             <a:endParaRPr lang="fr-FR" dirty="0"/>
           </a:p>
@@ -7541,7 +7555,7 @@
         <p:spPr>
           <a:xfrm>
             <a:off x="539552" y="1556792"/>
-            <a:ext cx="7772400" cy="4078039"/>
+            <a:ext cx="7772400" cy="4570482"/>
           </a:xfrm>
         </p:spPr>
         <p:txBody>
@@ -7553,11 +7567,11 @@
             <a:pPr lvl="0"/>
             <a:r>
               <a:rPr lang="fr-FR" dirty="0" smtClean="0"/>
-              <a:t>Un joueur </a:t>
+              <a:t>Un joueur ne peut jouer seul à un jeu de </a:t>
             </a:r>
             <a:r>
               <a:rPr lang="fr-FR" dirty="0" smtClean="0"/>
-              <a:t>ne peut jouer seul à un jeu de plateau.</a:t>
+              <a:t>plateau multijoueur comme les Echecs ou le jeu de Dames.</a:t>
             </a:r>
             <a:endParaRPr lang="fr-FR" dirty="0"/>
           </a:p>
@@ -7569,39 +7583,7 @@
             <a:pPr lvl="0"/>
             <a:r>
               <a:rPr lang="fr-FR" dirty="0" smtClean="0"/>
-              <a:t>Les joueurs </a:t>
-            </a:r>
-            <a:r>
-              <a:rPr lang="fr-FR" dirty="0" smtClean="0"/>
-              <a:t>de </a:t>
-            </a:r>
-            <a:r>
-              <a:rPr lang="fr-FR" dirty="0" smtClean="0"/>
-              <a:t>jeux de </a:t>
-            </a:r>
-            <a:r>
-              <a:rPr lang="fr-FR" dirty="0" smtClean="0"/>
-              <a:t>plateau </a:t>
-            </a:r>
-            <a:r>
-              <a:rPr lang="fr-FR" dirty="0" smtClean="0"/>
-              <a:t>préfèrent </a:t>
-            </a:r>
-            <a:r>
-              <a:rPr lang="fr-FR" dirty="0" smtClean="0"/>
-              <a:t>jouer </a:t>
-            </a:r>
-            <a:r>
-              <a:rPr lang="fr-FR" dirty="0" smtClean="0"/>
-              <a:t>sur des </a:t>
-            </a:r>
-            <a:r>
-              <a:rPr lang="fr-FR" dirty="0" smtClean="0"/>
-              <a:t>plateaux </a:t>
-            </a:r>
-            <a:r>
-              <a:rPr lang="fr-FR" dirty="0" smtClean="0"/>
-              <a:t>réels.</a:t>
+              <a:t>Les joueurs de jeux de plateau préfèrent jouer sur des plateaux réels.</a:t>
             </a:r>
           </a:p>
           <a:p>
@@ -7612,11 +7594,7 @@
             <a:pPr lvl="0"/>
             <a:r>
               <a:rPr lang="fr-FR" dirty="0" smtClean="0"/>
-              <a:t> </a:t>
-            </a:r>
-            <a:r>
-              <a:rPr lang="fr-FR" dirty="0" smtClean="0"/>
-              <a:t>Le Joueur souhaite pouvoir jouer sur un plateau contre une Intelligence Artificielle.</a:t>
+              <a:t> Le Joueur souhaite pouvoir jouer sur un plateau contre une Intelligence Artificielle.</a:t>
             </a:r>
             <a:endParaRPr lang="fr-FR" dirty="0"/>
           </a:p>
@@ -7690,7 +7668,7 @@
         <p:spPr>
           <a:xfrm>
             <a:off x="539552" y="1412776"/>
-            <a:ext cx="7772400" cy="3647152"/>
+            <a:ext cx="7772400" cy="4078039"/>
           </a:xfrm>
         </p:spPr>
         <p:txBody>
@@ -7702,11 +7680,39 @@
             <a:pPr lvl="0"/>
             <a:r>
               <a:rPr lang="fr-FR" sz="2800" dirty="0" smtClean="0"/>
-              <a:t>Permettre aux fans des jeux de plateau </a:t>
+              <a:t>Permettre </a:t>
             </a:r>
             <a:r>
               <a:rPr lang="fr-FR" sz="2800" dirty="0" smtClean="0"/>
-              <a:t>de jouer seuls à leurs jeux habituels.</a:t>
+              <a:t>à des joueurs </a:t>
+            </a:r>
+            <a:r>
+              <a:rPr lang="fr-FR" sz="2800" dirty="0" smtClean="0"/>
+              <a:t>de </a:t>
+            </a:r>
+            <a:r>
+              <a:rPr lang="fr-FR" sz="2800" dirty="0" smtClean="0"/>
+              <a:t>jeux de plateau de jouer seuls </a:t>
+            </a:r>
+            <a:r>
+              <a:rPr lang="fr-FR" sz="2800" dirty="0" smtClean="0"/>
+              <a:t>ou </a:t>
+            </a:r>
+            <a:r>
+              <a:rPr lang="fr-FR" sz="2800" dirty="0" smtClean="0"/>
+              <a:t>à plusieurs </a:t>
+            </a:r>
+            <a:r>
+              <a:rPr lang="fr-FR" sz="2800" dirty="0" smtClean="0"/>
+              <a:t>à </a:t>
+            </a:r>
+            <a:r>
+              <a:rPr lang="fr-FR" sz="2800" dirty="0" smtClean="0"/>
+              <a:t>leurs jeux </a:t>
+            </a:r>
+            <a:r>
+              <a:rPr lang="fr-FR" sz="2800" dirty="0" smtClean="0"/>
+              <a:t>habituels tout en ajoutant des joueurs Artificiels.</a:t>
             </a:r>
             <a:endParaRPr lang="fr-FR" sz="2800" dirty="0" smtClean="0"/>
           </a:p>
@@ -7823,23 +7829,7 @@
             <a:pPr lvl="0"/>
             <a:r>
               <a:rPr lang="fr-FR" dirty="0" smtClean="0"/>
-              <a:t>Développer </a:t>
-            </a:r>
-            <a:r>
-              <a:rPr lang="fr-FR" dirty="0" smtClean="0"/>
-              <a:t>une application permettant </a:t>
-            </a:r>
-            <a:r>
-              <a:rPr lang="fr-FR" dirty="0" smtClean="0"/>
-              <a:t>de jouer </a:t>
-            </a:r>
-            <a:r>
-              <a:rPr lang="fr-FR" dirty="0" smtClean="0"/>
-              <a:t>sur un plateau physique en </a:t>
-            </a:r>
-            <a:r>
-              <a:rPr lang="fr-FR" dirty="0" smtClean="0"/>
-              <a:t>réalité augmenté.</a:t>
+              <a:t>Développer une application permettant de jouer sur un plateau physique en réalité augmenté.</a:t>
             </a:r>
           </a:p>
           <a:p>
@@ -7863,7 +7853,6 @@
               <a:rPr lang="fr-FR" dirty="0" smtClean="0"/>
               <a:t>Développer une IA affrontant le joueur.</a:t>
             </a:r>
-            <a:endParaRPr lang="fr-FR" dirty="0" smtClean="0"/>
           </a:p>
         </p:txBody>
       </p:sp>
@@ -7935,7 +7924,7 @@
         <p:spPr>
           <a:xfrm>
             <a:off x="683568" y="1556792"/>
-            <a:ext cx="7772400" cy="2600712"/>
+            <a:ext cx="7772400" cy="3524042"/>
           </a:xfrm>
         </p:spPr>
         <p:txBody>
@@ -7947,29 +7936,18 @@
             <a:pPr lvl="0"/>
             <a:r>
               <a:rPr lang="fr-FR" sz="2000" dirty="0" smtClean="0"/>
-              <a:t>04/10 : </a:t>
+              <a:t>04/10 : Début du </a:t>
             </a:r>
             <a:r>
               <a:rPr lang="fr-FR" sz="2000" dirty="0" smtClean="0"/>
-              <a:t>Début du projet</a:t>
-            </a:r>
+              <a:t>projet</a:t>
+            </a:r>
+            <a:endParaRPr lang="fr-FR" sz="2000" dirty="0" smtClean="0"/>
           </a:p>
           <a:p>
             <a:r>
               <a:rPr lang="fr-FR" sz="2000" dirty="0" smtClean="0"/>
-              <a:t>25/10 : </a:t>
-            </a:r>
-            <a:r>
-              <a:rPr lang="fr-FR" sz="2000" dirty="0" smtClean="0"/>
-              <a:t>Présentation de la charte et </a:t>
-            </a:r>
-            <a:r>
-              <a:rPr lang="fr-FR" sz="2000" dirty="0" smtClean="0"/>
-              <a:t>du</a:t>
-            </a:r>
-            <a:r>
-              <a:rPr lang="fr-FR" sz="2000" dirty="0" smtClean="0"/>
-              <a:t> </a:t>
+              <a:t>25/10 : Présentation de la charte et du </a:t>
             </a:r>
             <a:r>
               <a:rPr lang="fr-FR" sz="2000" dirty="0" err="1" smtClean="0"/>
@@ -7980,61 +7958,75 @@
           <a:p>
             <a:r>
               <a:rPr lang="fr-FR" sz="2000" dirty="0" smtClean="0"/>
-              <a:t>15/11 : Lecture </a:t>
+              <a:t>15/11 : Lecture des QR </a:t>
             </a:r>
             <a:r>
               <a:rPr lang="fr-FR" sz="2000" dirty="0" smtClean="0"/>
-              <a:t>des QR codes</a:t>
-            </a:r>
+              <a:t>codes</a:t>
+            </a:r>
+            <a:endParaRPr lang="fr-FR" sz="2000" dirty="0" smtClean="0"/>
           </a:p>
           <a:p>
             <a:r>
               <a:rPr lang="fr-FR" sz="2000" dirty="0" smtClean="0"/>
-              <a:t>02/12 : Reconnaissance du Plateau</a:t>
-            </a:r>
+              <a:t>02/12 : Reconnaissance du </a:t>
+            </a:r>
+            <a:r>
+              <a:rPr lang="fr-FR" sz="2000" dirty="0" smtClean="0"/>
+              <a:t>Plateau</a:t>
+            </a:r>
+            <a:endParaRPr lang="fr-FR" sz="2000" dirty="0" smtClean="0"/>
           </a:p>
           <a:p>
             <a:r>
               <a:rPr lang="fr-FR" sz="2000" dirty="0" smtClean="0"/>
               <a:t>16/12 : Moteur de jeu fonctionnel </a:t>
             </a:r>
+            <a:r>
+              <a:rPr lang="fr-FR" sz="2000" dirty="0" smtClean="0"/>
+              <a:t>( Modèle de données, vérification 	     de la validité des coup joués, marquage des pions 			     éliminés,…)</a:t>
+            </a:r>
             <a:endParaRPr lang="fr-FR" sz="2000" dirty="0"/>
           </a:p>
           <a:p>
             <a:r>
               <a:rPr lang="fr-FR" sz="2000" dirty="0" smtClean="0"/>
-              <a:t>13</a:t>
+              <a:t>13/01 </a:t>
+            </a:r>
+            <a:r>
+              <a:rPr lang="fr-FR" sz="2000" smtClean="0"/>
+              <a:t>: </a:t>
+            </a:r>
+            <a:r>
+              <a:rPr lang="fr-FR" sz="2000" smtClean="0"/>
+              <a:t>Liaison </a:t>
             </a:r>
             <a:r>
               <a:rPr lang="fr-FR" sz="2000" dirty="0" smtClean="0"/>
-              <a:t>/01 : Liaison du moteur de jeu avec </a:t>
+              <a:t>du moteur de jeu avec </a:t>
             </a:r>
             <a:r>
               <a:rPr lang="fr-FR" sz="2000" dirty="0" smtClean="0"/>
-              <a:t>openCV </a:t>
+              <a:t>l’interface de </a:t>
+            </a:r>
+            <a:r>
+              <a:rPr lang="fr-FR" sz="2000" smtClean="0"/>
+              <a:t>réalité 		     augmentée</a:t>
             </a:r>
             <a:endParaRPr lang="fr-FR" sz="2000" dirty="0"/>
           </a:p>
           <a:p>
             <a:r>
               <a:rPr lang="fr-FR" sz="2000" dirty="0" smtClean="0"/>
-              <a:t>14/02 : </a:t>
+              <a:t>14/02 : Intégration de l’intelligence artificielle ( Joueur automatique) </a:t>
             </a:r>
             <a:r>
               <a:rPr lang="fr-FR" sz="2000" dirty="0" smtClean="0"/>
-              <a:t>Intégration de l’intelligence artificielle ( Joueur automatique</a:t>
+              <a:t>03/03 </a:t>
             </a:r>
             <a:r>
               <a:rPr lang="fr-FR" sz="2000" dirty="0" smtClean="0"/>
-              <a:t>) 03/03 : </a:t>
-            </a:r>
-            <a:r>
-              <a:rPr lang="fr-FR" sz="2000" dirty="0" smtClean="0"/>
-              <a:t>Fin de </a:t>
-            </a:r>
-            <a:r>
-              <a:rPr lang="fr-FR" sz="2000" dirty="0" smtClean="0"/>
-              <a:t>projet</a:t>
+              <a:t>: Fin de projet</a:t>
             </a:r>
             <a:endParaRPr lang="fr-FR" sz="2000" dirty="0"/>
           </a:p>

</xml_diff>

<commit_message>
Modifications Rapport et Backlog
Reformulations du  Rapport mi - parcours, et mise a jour du Backlog
</commit_message>
<xml_diff>
--- a/CharteProjet.pptx
+++ b/CharteProjet.pptx
@@ -228,7 +228,7 @@
             <a:fld id="{7BD930DB-D4F5-4FDE-8AC3-8250ED0960B9}" type="datetimeFigureOut">
               <a:rPr lang="fr-FR" smtClean="0"/>
               <a:pPr/>
-              <a:t>02/12/2016</a:t>
+              <a:t>02/02/2017</a:t>
             </a:fld>
             <a:endParaRPr lang="fr-FR"/>
           </a:p>
@@ -494,7 +494,7 @@
             <a:fld id="{32F746F0-8997-42DA-969E-DF4F046D0DC3}" type="datetimeFigureOut">
               <a:rPr lang="fr-FR" smtClean="0"/>
               <a:pPr/>
-              <a:t>02/12/2016</a:t>
+              <a:t>02/02/2017</a:t>
             </a:fld>
             <a:endParaRPr lang="fr-FR"/>
           </a:p>
@@ -661,7 +661,7 @@
             <a:fld id="{32F746F0-8997-42DA-969E-DF4F046D0DC3}" type="datetimeFigureOut">
               <a:rPr lang="fr-FR" smtClean="0"/>
               <a:pPr/>
-              <a:t>02/12/2016</a:t>
+              <a:t>02/02/2017</a:t>
             </a:fld>
             <a:endParaRPr lang="fr-FR"/>
           </a:p>
@@ -845,7 +845,7 @@
             <a:fld id="{32F746F0-8997-42DA-969E-DF4F046D0DC3}" type="datetimeFigureOut">
               <a:rPr lang="fr-FR" smtClean="0"/>
               <a:pPr/>
-              <a:t>02/12/2016</a:t>
+              <a:t>02/02/2017</a:t>
             </a:fld>
             <a:endParaRPr lang="fr-FR"/>
           </a:p>
@@ -1104,7 +1104,7 @@
             <a:fld id="{01593C87-16AC-4986-9211-671D42D377FC}" type="datetimeFigureOut">
               <a:rPr lang="fr-FR" smtClean="0"/>
               <a:pPr/>
-              <a:t>02/12/2016</a:t>
+              <a:t>02/02/2017</a:t>
             </a:fld>
             <a:endParaRPr lang="fr-FR"/>
           </a:p>
@@ -1605,7 +1605,7 @@
             <a:fld id="{32F746F0-8997-42DA-969E-DF4F046D0DC3}" type="datetimeFigureOut">
               <a:rPr lang="fr-FR" smtClean="0"/>
               <a:pPr/>
-              <a:t>02/12/2016</a:t>
+              <a:t>02/02/2017</a:t>
             </a:fld>
             <a:endParaRPr lang="fr-FR"/>
           </a:p>
@@ -1835,7 +1835,7 @@
             <a:fld id="{32F746F0-8997-42DA-969E-DF4F046D0DC3}" type="datetimeFigureOut">
               <a:rPr lang="fr-FR" smtClean="0"/>
               <a:pPr/>
-              <a:t>02/12/2016</a:t>
+              <a:t>02/02/2017</a:t>
             </a:fld>
             <a:endParaRPr lang="fr-FR"/>
           </a:p>
@@ -2195,7 +2195,7 @@
             <a:fld id="{32F746F0-8997-42DA-969E-DF4F046D0DC3}" type="datetimeFigureOut">
               <a:rPr lang="fr-FR" smtClean="0"/>
               <a:pPr/>
-              <a:t>02/12/2016</a:t>
+              <a:t>02/02/2017</a:t>
             </a:fld>
             <a:endParaRPr lang="fr-FR"/>
           </a:p>
@@ -2484,7 +2484,7 @@
             <a:fld id="{32F746F0-8997-42DA-969E-DF4F046D0DC3}" type="datetimeFigureOut">
               <a:rPr lang="fr-FR" smtClean="0"/>
               <a:pPr/>
-              <a:t>02/12/2016</a:t>
+              <a:t>02/02/2017</a:t>
             </a:fld>
             <a:endParaRPr lang="fr-FR"/>
           </a:p>
@@ -2908,7 +2908,7 @@
             <a:fld id="{32F746F0-8997-42DA-969E-DF4F046D0DC3}" type="datetimeFigureOut">
               <a:rPr lang="fr-FR" smtClean="0"/>
               <a:pPr/>
-              <a:t>02/12/2016</a:t>
+              <a:t>02/02/2017</a:t>
             </a:fld>
             <a:endParaRPr lang="fr-FR"/>
           </a:p>
@@ -3025,7 +3025,7 @@
             <a:fld id="{32F746F0-8997-42DA-969E-DF4F046D0DC3}" type="datetimeFigureOut">
               <a:rPr lang="fr-FR" smtClean="0"/>
               <a:pPr/>
-              <a:t>02/12/2016</a:t>
+              <a:t>02/02/2017</a:t>
             </a:fld>
             <a:endParaRPr lang="fr-FR"/>
           </a:p>
@@ -3117,7 +3117,7 @@
             <a:fld id="{32F746F0-8997-42DA-969E-DF4F046D0DC3}" type="datetimeFigureOut">
               <a:rPr lang="fr-FR" smtClean="0"/>
               <a:pPr/>
-              <a:t>02/12/2016</a:t>
+              <a:t>02/02/2017</a:t>
             </a:fld>
             <a:endParaRPr lang="fr-FR"/>
           </a:p>
@@ -3284,7 +3284,7 @@
             <a:fld id="{32F746F0-8997-42DA-969E-DF4F046D0DC3}" type="datetimeFigureOut">
               <a:rPr lang="fr-FR" smtClean="0"/>
               <a:pPr/>
-              <a:t>02/12/2016</a:t>
+              <a:t>02/02/2017</a:t>
             </a:fld>
             <a:endParaRPr lang="fr-FR"/>
           </a:p>
@@ -3564,7 +3564,7 @@
             <a:fld id="{32F746F0-8997-42DA-969E-DF4F046D0DC3}" type="datetimeFigureOut">
               <a:rPr lang="fr-FR" smtClean="0"/>
               <a:pPr/>
-              <a:t>02/12/2016</a:t>
+              <a:t>02/02/2017</a:t>
             </a:fld>
             <a:endParaRPr lang="fr-FR"/>
           </a:p>
@@ -3932,7 +3932,7 @@
             <a:fld id="{32F746F0-8997-42DA-969E-DF4F046D0DC3}" type="datetimeFigureOut">
               <a:rPr lang="fr-FR" smtClean="0"/>
               <a:pPr/>
-              <a:t>02/12/2016</a:t>
+              <a:t>02/02/2017</a:t>
             </a:fld>
             <a:endParaRPr lang="fr-FR"/>
           </a:p>
@@ -4217,7 +4217,7 @@
             <a:fld id="{32F746F0-8997-42DA-969E-DF4F046D0DC3}" type="datetimeFigureOut">
               <a:rPr lang="fr-FR" smtClean="0"/>
               <a:pPr/>
-              <a:t>02/12/2016</a:t>
+              <a:t>02/02/2017</a:t>
             </a:fld>
             <a:endParaRPr lang="fr-FR"/>
           </a:p>
@@ -4499,7 +4499,7 @@
             <a:fld id="{32F746F0-8997-42DA-969E-DF4F046D0DC3}" type="datetimeFigureOut">
               <a:rPr lang="fr-FR" smtClean="0"/>
               <a:pPr/>
-              <a:t>02/12/2016</a:t>
+              <a:t>02/02/2017</a:t>
             </a:fld>
             <a:endParaRPr lang="fr-FR"/>
           </a:p>
@@ -4747,7 +4747,7 @@
             <a:fld id="{32F746F0-8997-42DA-969E-DF4F046D0DC3}" type="datetimeFigureOut">
               <a:rPr lang="fr-FR" smtClean="0"/>
               <a:pPr/>
-              <a:t>02/12/2016</a:t>
+              <a:t>02/02/2017</a:t>
             </a:fld>
             <a:endParaRPr lang="fr-FR"/>
           </a:p>
@@ -5032,7 +5032,7 @@
             <a:fld id="{32F746F0-8997-42DA-969E-DF4F046D0DC3}" type="datetimeFigureOut">
               <a:rPr lang="fr-FR" smtClean="0"/>
               <a:pPr/>
-              <a:t>02/12/2016</a:t>
+              <a:t>02/02/2017</a:t>
             </a:fld>
             <a:endParaRPr lang="fr-FR"/>
           </a:p>
@@ -5451,7 +5451,7 @@
             <a:fld id="{32F746F0-8997-42DA-969E-DF4F046D0DC3}" type="datetimeFigureOut">
               <a:rPr lang="fr-FR" smtClean="0"/>
               <a:pPr/>
-              <a:t>02/12/2016</a:t>
+              <a:t>02/02/2017</a:t>
             </a:fld>
             <a:endParaRPr lang="fr-FR"/>
           </a:p>
@@ -5566,7 +5566,7 @@
             <a:fld id="{32F746F0-8997-42DA-969E-DF4F046D0DC3}" type="datetimeFigureOut">
               <a:rPr lang="fr-FR" smtClean="0"/>
               <a:pPr/>
-              <a:t>02/12/2016</a:t>
+              <a:t>02/02/2017</a:t>
             </a:fld>
             <a:endParaRPr lang="fr-FR"/>
           </a:p>
@@ -5658,7 +5658,7 @@
             <a:fld id="{32F746F0-8997-42DA-969E-DF4F046D0DC3}" type="datetimeFigureOut">
               <a:rPr lang="fr-FR" smtClean="0"/>
               <a:pPr/>
-              <a:t>02/12/2016</a:t>
+              <a:t>02/02/2017</a:t>
             </a:fld>
             <a:endParaRPr lang="fr-FR"/>
           </a:p>
@@ -5932,7 +5932,7 @@
             <a:fld id="{32F746F0-8997-42DA-969E-DF4F046D0DC3}" type="datetimeFigureOut">
               <a:rPr lang="fr-FR" smtClean="0"/>
               <a:pPr/>
-              <a:t>02/12/2016</a:t>
+              <a:t>02/02/2017</a:t>
             </a:fld>
             <a:endParaRPr lang="fr-FR"/>
           </a:p>
@@ -6182,7 +6182,7 @@
             <a:fld id="{32F746F0-8997-42DA-969E-DF4F046D0DC3}" type="datetimeFigureOut">
               <a:rPr lang="fr-FR" smtClean="0"/>
               <a:pPr/>
-              <a:t>02/12/2016</a:t>
+              <a:t>02/02/2017</a:t>
             </a:fld>
             <a:endParaRPr lang="fr-FR"/>
           </a:p>
@@ -6392,7 +6392,7 @@
             <a:fld id="{32F746F0-8997-42DA-969E-DF4F046D0DC3}" type="datetimeFigureOut">
               <a:rPr lang="fr-FR" smtClean="0"/>
               <a:pPr/>
-              <a:t>02/12/2016</a:t>
+              <a:t>02/02/2017</a:t>
             </a:fld>
             <a:endParaRPr lang="fr-FR"/>
           </a:p>
@@ -7022,7 +7022,7 @@
             <a:fld id="{32F746F0-8997-42DA-969E-DF4F046D0DC3}" type="datetimeFigureOut">
               <a:rPr lang="fr-FR" smtClean="0"/>
               <a:pPr/>
-              <a:t>02/12/2016</a:t>
+              <a:t>02/02/2017</a:t>
             </a:fld>
             <a:endParaRPr lang="fr-FR"/>
           </a:p>
@@ -7453,15 +7453,7 @@
             </a:br>
             <a:r>
               <a:rPr lang="fr-FR" dirty="0" smtClean="0"/>
-              <a:t>-En réalité </a:t>
-            </a:r>
-            <a:r>
-              <a:rPr lang="fr-FR" dirty="0" smtClean="0"/>
-              <a:t>augmentée </a:t>
-            </a:r>
-            <a:r>
-              <a:rPr lang="fr-FR" dirty="0" smtClean="0"/>
-              <a:t>-</a:t>
+              <a:t>-En réalité augmentée -</a:t>
             </a:r>
             <a:endParaRPr lang="fr-FR" dirty="0"/>
           </a:p>
@@ -7489,11 +7481,7 @@
           <a:p>
             <a:r>
               <a:rPr lang="fr-FR" dirty="0" smtClean="0"/>
-              <a:t>Jeux de plateau en réalité </a:t>
-            </a:r>
-            <a:r>
-              <a:rPr lang="fr-FR" dirty="0" smtClean="0"/>
-              <a:t>augmentée.</a:t>
+              <a:t>Jeux de plateau en réalité augmentée.</a:t>
             </a:r>
             <a:endParaRPr lang="fr-FR" dirty="0"/>
           </a:p>
@@ -7804,13 +7792,8 @@
             <a:pPr lvl="0"/>
             <a:r>
               <a:rPr lang="fr-FR" dirty="0" smtClean="0"/>
-              <a:t>Développer une application permettant de jouer sur un plateau physique en réalité </a:t>
-            </a:r>
-            <a:r>
-              <a:rPr lang="fr-FR" dirty="0" smtClean="0"/>
-              <a:t>augmentée.</a:t>
-            </a:r>
-            <a:endParaRPr lang="fr-FR" dirty="0" smtClean="0"/>
+              <a:t>Développer une application permettant de jouer sur un plateau physique en réalité augmentée.</a:t>
+            </a:r>
           </a:p>
           <a:p>
             <a:pPr lvl="0"/>
@@ -7835,11 +7818,7 @@
             </a:r>
             <a:r>
               <a:rPr lang="fr-FR" dirty="0" smtClean="0"/>
-              <a:t> une </a:t>
-            </a:r>
-            <a:r>
-              <a:rPr lang="fr-FR" dirty="0" smtClean="0"/>
-              <a:t>IA affrontant le joueur.</a:t>
+              <a:t> une IA affrontant le joueur.</a:t>
             </a:r>
           </a:p>
         </p:txBody>

</xml_diff>